<commit_message>
powerpoint changes, submitted version
</commit_message>
<xml_diff>
--- a/final_presentation_slides.pptx
+++ b/final_presentation_slides.pptx
@@ -1,6 +1,6 @@
 
 <file path=ppt/presentation.xml><?xml version="1.0" encoding="utf-8"?>
-<p:presentation xmlns:a="http://schemas.openxmlformats.org/drawingml/2006/main" xmlns:r="http://schemas.openxmlformats.org/officeDocument/2006/relationships" xmlns:p="http://schemas.openxmlformats.org/presentationml/2006/main" saveSubsetFonts="1" autoCompressPictures="0">
+<p:presentation xmlns:a="http://schemas.openxmlformats.org/drawingml/2006/main" xmlns:r="http://schemas.openxmlformats.org/officeDocument/2006/relationships" xmlns:mc="http://schemas.openxmlformats.org/markup-compatibility/2006" xmlns:mv="urn:schemas-microsoft-com:mac:vml" xmlns:p="http://schemas.openxmlformats.org/presentationml/2006/main" mc:Ignorable="mv" mc:PreserveAttributes="mv:*" saveSubsetFonts="1" autoCompressPictures="0">
   <p:sldMasterIdLst>
     <p:sldMasterId id="2147483660" r:id="rId1"/>
   </p:sldMasterIdLst>
@@ -128,7 +128,7 @@
 </file>
 
 <file path=ppt/notesMasters/notesMaster1.xml><?xml version="1.0" encoding="utf-8"?>
-<p:notesMaster xmlns:a="http://schemas.openxmlformats.org/drawingml/2006/main" xmlns:r="http://schemas.openxmlformats.org/officeDocument/2006/relationships" xmlns:p="http://schemas.openxmlformats.org/presentationml/2006/main">
+<p:notesMaster xmlns:a="http://schemas.openxmlformats.org/drawingml/2006/main" xmlns:r="http://schemas.openxmlformats.org/officeDocument/2006/relationships" xmlns:mc="http://schemas.openxmlformats.org/markup-compatibility/2006" xmlns:mv="urn:schemas-microsoft-com:mac:vml" xmlns:p="http://schemas.openxmlformats.org/presentationml/2006/main" mc:Ignorable="mv" mc:PreserveAttributes="mv:*">
   <p:cSld>
     <p:bg>
       <p:bgRef idx="1001">
@@ -209,6 +209,7 @@
           <a:p>
             <a:fld id="{3E952C7F-E4B0-0A49-B1EC-10BE7CE03CFF}" type="datetimeFigureOut">
               <a:rPr lang="en-US" smtClean="0"/>
+              <a:pPr/>
               <a:t>5/3/16</a:t>
             </a:fld>
             <a:endParaRPr lang="en-US"/>
@@ -368,6 +369,7 @@
           <a:p>
             <a:fld id="{21C9DDF2-0736-154F-BD23-A26CF65392B0}" type="slidenum">
               <a:rPr lang="en-US" smtClean="0"/>
+              <a:pPr/>
               <a:t>‹#›</a:t>
             </a:fld>
             <a:endParaRPr lang="en-US"/>
@@ -377,7 +379,7 @@
     </p:spTree>
     <p:extLst>
       <p:ext uri="{BB962C8B-B14F-4D97-AF65-F5344CB8AC3E}">
-        <p14:creationId xmlns:p14="http://schemas.microsoft.com/office/powerpoint/2010/main" val="204990716"/>
+        <p14:creationId xmlns:p14="http://schemas.microsoft.com/office/powerpoint/2010/main" xmlns:p="http://schemas.openxmlformats.org/presentationml/2006/main" xmlns:r="http://schemas.openxmlformats.org/officeDocument/2006/relationships" xmlns:a="http://schemas.openxmlformats.org/drawingml/2006/main" xmlns="" val="204990716"/>
       </p:ext>
     </p:extLst>
   </p:cSld>
@@ -478,7 +480,7 @@
 </file>
 
 <file path=ppt/notesSlides/notesSlide1.xml><?xml version="1.0" encoding="utf-8"?>
-<p:notes xmlns:a="http://schemas.openxmlformats.org/drawingml/2006/main" xmlns:r="http://schemas.openxmlformats.org/officeDocument/2006/relationships" xmlns:p="http://schemas.openxmlformats.org/presentationml/2006/main">
+<p:notes xmlns:a="http://schemas.openxmlformats.org/drawingml/2006/main" xmlns:r="http://schemas.openxmlformats.org/officeDocument/2006/relationships" xmlns:mc="http://schemas.openxmlformats.org/markup-compatibility/2006" xmlns:mv="urn:schemas-microsoft-com:mac:vml" xmlns:p="http://schemas.openxmlformats.org/presentationml/2006/main" mc:Ignorable="mv" mc:PreserveAttributes="mv:*">
   <p:cSld>
     <p:spTree>
       <p:nvGrpSpPr>
@@ -542,6 +544,7 @@
           <a:p>
             <a:fld id="{21C9DDF2-0736-154F-BD23-A26CF65392B0}" type="slidenum">
               <a:rPr lang="en-US" smtClean="0"/>
+              <a:pPr/>
               <a:t>5</a:t>
             </a:fld>
             <a:endParaRPr lang="en-US"/>
@@ -551,7 +554,7 @@
     </p:spTree>
     <p:extLst>
       <p:ext uri="{BB962C8B-B14F-4D97-AF65-F5344CB8AC3E}">
-        <p14:creationId xmlns:p14="http://schemas.microsoft.com/office/powerpoint/2010/main" val="2940323280"/>
+        <p14:creationId xmlns:p14="http://schemas.microsoft.com/office/powerpoint/2010/main" xmlns:p="http://schemas.openxmlformats.org/presentationml/2006/main" xmlns:r="http://schemas.openxmlformats.org/officeDocument/2006/relationships" xmlns:a="http://schemas.openxmlformats.org/drawingml/2006/main" xmlns="" val="2940323280"/>
       </p:ext>
     </p:extLst>
   </p:cSld>
@@ -562,7 +565,7 @@
 </file>
 
 <file path=ppt/slideLayouts/slideLayout1.xml><?xml version="1.0" encoding="utf-8"?>
-<p:sldLayout xmlns:a="http://schemas.openxmlformats.org/drawingml/2006/main" xmlns:r="http://schemas.openxmlformats.org/officeDocument/2006/relationships" xmlns:p="http://schemas.openxmlformats.org/presentationml/2006/main" showMasterSp="0" type="title" preserve="1">
+<p:sldLayout xmlns:a="http://schemas.openxmlformats.org/drawingml/2006/main" xmlns:r="http://schemas.openxmlformats.org/officeDocument/2006/relationships" xmlns:mc="http://schemas.openxmlformats.org/markup-compatibility/2006" xmlns:mv="urn:schemas-microsoft-com:mac:vml" xmlns:p="http://schemas.openxmlformats.org/presentationml/2006/main" mc:Ignorable="mv" mc:PreserveAttributes="mv:*" showMasterSp="0" type="title" preserve="1">
   <p:cSld name="Title Slide">
     <p:spTree>
       <p:nvGrpSpPr>
@@ -1029,6 +1032,7 @@
           <a:p>
             <a:fld id="{4F310800-ADAC-3D47-A1ED-30EBE55D9E2F}" type="datetimeFigureOut">
               <a:rPr lang="en-US" smtClean="0"/>
+              <a:pPr/>
               <a:t>5/3/16</a:t>
             </a:fld>
             <a:endParaRPr lang="en-US"/>
@@ -1071,6 +1075,7 @@
           <a:p>
             <a:fld id="{0EF7F39D-C77D-4041-9320-0257EEFDD78C}" type="slidenum">
               <a:rPr lang="en-US" smtClean="0"/>
+              <a:pPr/>
               <a:t>‹#›</a:t>
             </a:fld>
             <a:endParaRPr lang="en-US"/>
@@ -1086,7 +1091,7 @@
 </file>
 
 <file path=ppt/slideLayouts/slideLayout10.xml><?xml version="1.0" encoding="utf-8"?>
-<p:sldLayout xmlns:a="http://schemas.openxmlformats.org/drawingml/2006/main" xmlns:r="http://schemas.openxmlformats.org/officeDocument/2006/relationships" xmlns:p="http://schemas.openxmlformats.org/presentationml/2006/main" type="vertTx" preserve="1">
+<p:sldLayout xmlns:a="http://schemas.openxmlformats.org/drawingml/2006/main" xmlns:r="http://schemas.openxmlformats.org/officeDocument/2006/relationships" xmlns:mc="http://schemas.openxmlformats.org/markup-compatibility/2006" xmlns:mv="urn:schemas-microsoft-com:mac:vml" xmlns:p="http://schemas.openxmlformats.org/presentationml/2006/main" mc:Ignorable="mv" mc:PreserveAttributes="mv:*" type="vertTx" preserve="1">
   <p:cSld name="Title and Vertical Text">
     <p:spTree>
       <p:nvGrpSpPr>
@@ -1194,6 +1199,7 @@
           <a:p>
             <a:fld id="{4F310800-ADAC-3D47-A1ED-30EBE55D9E2F}" type="datetimeFigureOut">
               <a:rPr lang="en-US" smtClean="0"/>
+              <a:pPr/>
               <a:t>5/3/16</a:t>
             </a:fld>
             <a:endParaRPr lang="en-US"/>
@@ -1236,6 +1242,7 @@
           <a:p>
             <a:fld id="{0EF7F39D-C77D-4041-9320-0257EEFDD78C}" type="slidenum">
               <a:rPr lang="en-US" smtClean="0"/>
+              <a:pPr/>
               <a:t>‹#›</a:t>
             </a:fld>
             <a:endParaRPr lang="en-US"/>
@@ -1251,7 +1258,7 @@
 </file>
 
 <file path=ppt/slideLayouts/slideLayout11.xml><?xml version="1.0" encoding="utf-8"?>
-<p:sldLayout xmlns:a="http://schemas.openxmlformats.org/drawingml/2006/main" xmlns:r="http://schemas.openxmlformats.org/officeDocument/2006/relationships" xmlns:p="http://schemas.openxmlformats.org/presentationml/2006/main" type="vertTitleAndTx" preserve="1">
+<p:sldLayout xmlns:a="http://schemas.openxmlformats.org/drawingml/2006/main" xmlns:r="http://schemas.openxmlformats.org/officeDocument/2006/relationships" xmlns:mc="http://schemas.openxmlformats.org/markup-compatibility/2006" xmlns:mv="urn:schemas-microsoft-com:mac:vml" xmlns:p="http://schemas.openxmlformats.org/presentationml/2006/main" mc:Ignorable="mv" mc:PreserveAttributes="mv:*" type="vertTitleAndTx" preserve="1">
   <p:cSld name="Vertical Title and Text">
     <p:spTree>
       <p:nvGrpSpPr>
@@ -1369,6 +1376,7 @@
           <a:p>
             <a:fld id="{4F310800-ADAC-3D47-A1ED-30EBE55D9E2F}" type="datetimeFigureOut">
               <a:rPr lang="en-US" smtClean="0"/>
+              <a:pPr/>
               <a:t>5/3/16</a:t>
             </a:fld>
             <a:endParaRPr lang="en-US"/>
@@ -1411,6 +1419,7 @@
           <a:p>
             <a:fld id="{0EF7F39D-C77D-4041-9320-0257EEFDD78C}" type="slidenum">
               <a:rPr lang="en-US" smtClean="0"/>
+              <a:pPr/>
               <a:t>‹#›</a:t>
             </a:fld>
             <a:endParaRPr lang="en-US"/>
@@ -1426,7 +1435,7 @@
 </file>
 
 <file path=ppt/slideLayouts/slideLayout2.xml><?xml version="1.0" encoding="utf-8"?>
-<p:sldLayout xmlns:a="http://schemas.openxmlformats.org/drawingml/2006/main" xmlns:r="http://schemas.openxmlformats.org/officeDocument/2006/relationships" xmlns:p="http://schemas.openxmlformats.org/presentationml/2006/main" type="obj" preserve="1">
+<p:sldLayout xmlns:a="http://schemas.openxmlformats.org/drawingml/2006/main" xmlns:r="http://schemas.openxmlformats.org/officeDocument/2006/relationships" xmlns:mc="http://schemas.openxmlformats.org/markup-compatibility/2006" xmlns:mv="urn:schemas-microsoft-com:mac:vml" xmlns:p="http://schemas.openxmlformats.org/presentationml/2006/main" mc:Ignorable="mv" mc:PreserveAttributes="mv:*" type="obj" preserve="1">
   <p:cSld name="Title and Content">
     <p:spTree>
       <p:nvGrpSpPr>
@@ -1534,6 +1543,7 @@
           <a:p>
             <a:fld id="{4F310800-ADAC-3D47-A1ED-30EBE55D9E2F}" type="datetimeFigureOut">
               <a:rPr lang="en-US" smtClean="0"/>
+              <a:pPr/>
               <a:t>5/3/16</a:t>
             </a:fld>
             <a:endParaRPr lang="en-US"/>
@@ -1576,6 +1586,7 @@
           <a:p>
             <a:fld id="{0EF7F39D-C77D-4041-9320-0257EEFDD78C}" type="slidenum">
               <a:rPr lang="en-US" smtClean="0"/>
+              <a:pPr/>
               <a:t>‹#›</a:t>
             </a:fld>
             <a:endParaRPr lang="en-US"/>
@@ -1591,7 +1602,7 @@
 </file>
 
 <file path=ppt/slideLayouts/slideLayout3.xml><?xml version="1.0" encoding="utf-8"?>
-<p:sldLayout xmlns:a="http://schemas.openxmlformats.org/drawingml/2006/main" xmlns:r="http://schemas.openxmlformats.org/officeDocument/2006/relationships" xmlns:p="http://schemas.openxmlformats.org/presentationml/2006/main" showMasterSp="0" type="secHead" preserve="1">
+<p:sldLayout xmlns:a="http://schemas.openxmlformats.org/drawingml/2006/main" xmlns:r="http://schemas.openxmlformats.org/officeDocument/2006/relationships" xmlns:mc="http://schemas.openxmlformats.org/markup-compatibility/2006" xmlns:mv="urn:schemas-microsoft-com:mac:vml" xmlns:p="http://schemas.openxmlformats.org/presentationml/2006/main" mc:Ignorable="mv" mc:PreserveAttributes="mv:*" showMasterSp="0" type="secHead" preserve="1">
   <p:cSld name="Section Header">
     <p:spTree>
       <p:nvGrpSpPr>
@@ -2087,6 +2098,7 @@
           <a:p>
             <a:fld id="{4F310800-ADAC-3D47-A1ED-30EBE55D9E2F}" type="datetimeFigureOut">
               <a:rPr lang="en-US" smtClean="0"/>
+              <a:pPr/>
               <a:t>5/3/16</a:t>
             </a:fld>
             <a:endParaRPr lang="en-US"/>
@@ -2129,6 +2141,7 @@
           <a:p>
             <a:fld id="{0EF7F39D-C77D-4041-9320-0257EEFDD78C}" type="slidenum">
               <a:rPr lang="en-US" smtClean="0"/>
+              <a:pPr/>
               <a:t>‹#›</a:t>
             </a:fld>
             <a:endParaRPr lang="en-US"/>
@@ -2144,7 +2157,7 @@
 </file>
 
 <file path=ppt/slideLayouts/slideLayout4.xml><?xml version="1.0" encoding="utf-8"?>
-<p:sldLayout xmlns:a="http://schemas.openxmlformats.org/drawingml/2006/main" xmlns:r="http://schemas.openxmlformats.org/officeDocument/2006/relationships" xmlns:p="http://schemas.openxmlformats.org/presentationml/2006/main" type="twoObj" preserve="1">
+<p:sldLayout xmlns:a="http://schemas.openxmlformats.org/drawingml/2006/main" xmlns:r="http://schemas.openxmlformats.org/officeDocument/2006/relationships" xmlns:mc="http://schemas.openxmlformats.org/markup-compatibility/2006" xmlns:mv="urn:schemas-microsoft-com:mac:vml" xmlns:p="http://schemas.openxmlformats.org/presentationml/2006/main" mc:Ignorable="mv" mc:PreserveAttributes="mv:*" type="twoObj" preserve="1">
   <p:cSld name="Two Content">
     <p:spTree>
       <p:nvGrpSpPr>
@@ -2347,6 +2360,7 @@
           <a:p>
             <a:fld id="{4F310800-ADAC-3D47-A1ED-30EBE55D9E2F}" type="datetimeFigureOut">
               <a:rPr lang="en-US" smtClean="0"/>
+              <a:pPr/>
               <a:t>5/3/16</a:t>
             </a:fld>
             <a:endParaRPr lang="en-US"/>
@@ -2389,6 +2403,7 @@
           <a:p>
             <a:fld id="{0EF7F39D-C77D-4041-9320-0257EEFDD78C}" type="slidenum">
               <a:rPr lang="en-US" smtClean="0"/>
+              <a:pPr/>
               <a:t>‹#›</a:t>
             </a:fld>
             <a:endParaRPr lang="en-US"/>
@@ -2427,7 +2442,7 @@
 </file>
 
 <file path=ppt/slideLayouts/slideLayout5.xml><?xml version="1.0" encoding="utf-8"?>
-<p:sldLayout xmlns:a="http://schemas.openxmlformats.org/drawingml/2006/main" xmlns:r="http://schemas.openxmlformats.org/officeDocument/2006/relationships" xmlns:p="http://schemas.openxmlformats.org/presentationml/2006/main" type="twoTxTwoObj" preserve="1">
+<p:sldLayout xmlns:a="http://schemas.openxmlformats.org/drawingml/2006/main" xmlns:r="http://schemas.openxmlformats.org/officeDocument/2006/relationships" xmlns:mc="http://schemas.openxmlformats.org/markup-compatibility/2006" xmlns:mv="urn:schemas-microsoft-com:mac:vml" xmlns:p="http://schemas.openxmlformats.org/presentationml/2006/main" mc:Ignorable="mv" mc:PreserveAttributes="mv:*" type="twoTxTwoObj" preserve="1">
   <p:cSld name="Comparison">
     <p:spTree>
       <p:nvGrpSpPr>
@@ -2835,6 +2850,7 @@
           <a:p>
             <a:fld id="{4F310800-ADAC-3D47-A1ED-30EBE55D9E2F}" type="datetimeFigureOut">
               <a:rPr lang="en-US" smtClean="0"/>
+              <a:pPr/>
               <a:t>5/3/16</a:t>
             </a:fld>
             <a:endParaRPr lang="en-US"/>
@@ -2877,6 +2893,7 @@
           <a:p>
             <a:fld id="{0EF7F39D-C77D-4041-9320-0257EEFDD78C}" type="slidenum">
               <a:rPr lang="en-US" smtClean="0"/>
+              <a:pPr/>
               <a:t>‹#›</a:t>
             </a:fld>
             <a:endParaRPr lang="en-US"/>
@@ -2892,7 +2909,7 @@
 </file>
 
 <file path=ppt/slideLayouts/slideLayout6.xml><?xml version="1.0" encoding="utf-8"?>
-<p:sldLayout xmlns:a="http://schemas.openxmlformats.org/drawingml/2006/main" xmlns:r="http://schemas.openxmlformats.org/officeDocument/2006/relationships" xmlns:p="http://schemas.openxmlformats.org/presentationml/2006/main" type="titleOnly" preserve="1">
+<p:sldLayout xmlns:a="http://schemas.openxmlformats.org/drawingml/2006/main" xmlns:r="http://schemas.openxmlformats.org/officeDocument/2006/relationships" xmlns:mc="http://schemas.openxmlformats.org/markup-compatibility/2006" xmlns:mv="urn:schemas-microsoft-com:mac:vml" xmlns:p="http://schemas.openxmlformats.org/presentationml/2006/main" mc:Ignorable="mv" mc:PreserveAttributes="mv:*" type="titleOnly" preserve="1">
   <p:cSld name="Title Only">
     <p:spTree>
       <p:nvGrpSpPr>
@@ -2948,6 +2965,7 @@
           <a:p>
             <a:fld id="{4F310800-ADAC-3D47-A1ED-30EBE55D9E2F}" type="datetimeFigureOut">
               <a:rPr lang="en-US" smtClean="0"/>
+              <a:pPr/>
               <a:t>5/3/16</a:t>
             </a:fld>
             <a:endParaRPr lang="en-US"/>
@@ -2990,6 +3008,7 @@
           <a:p>
             <a:fld id="{0EF7F39D-C77D-4041-9320-0257EEFDD78C}" type="slidenum">
               <a:rPr lang="en-US" smtClean="0"/>
+              <a:pPr/>
               <a:t>‹#›</a:t>
             </a:fld>
             <a:endParaRPr lang="en-US"/>
@@ -3005,7 +3024,7 @@
 </file>
 
 <file path=ppt/slideLayouts/slideLayout7.xml><?xml version="1.0" encoding="utf-8"?>
-<p:sldLayout xmlns:a="http://schemas.openxmlformats.org/drawingml/2006/main" xmlns:r="http://schemas.openxmlformats.org/officeDocument/2006/relationships" xmlns:p="http://schemas.openxmlformats.org/presentationml/2006/main" type="blank" preserve="1">
+<p:sldLayout xmlns:a="http://schemas.openxmlformats.org/drawingml/2006/main" xmlns:r="http://schemas.openxmlformats.org/officeDocument/2006/relationships" xmlns:mc="http://schemas.openxmlformats.org/markup-compatibility/2006" xmlns:mv="urn:schemas-microsoft-com:mac:vml" xmlns:p="http://schemas.openxmlformats.org/presentationml/2006/main" mc:Ignorable="mv" mc:PreserveAttributes="mv:*" type="blank" preserve="1">
   <p:cSld name="Blank">
     <p:spTree>
       <p:nvGrpSpPr>
@@ -3038,6 +3057,7 @@
           <a:p>
             <a:fld id="{4F310800-ADAC-3D47-A1ED-30EBE55D9E2F}" type="datetimeFigureOut">
               <a:rPr lang="en-US" smtClean="0"/>
+              <a:pPr/>
               <a:t>5/3/16</a:t>
             </a:fld>
             <a:endParaRPr lang="en-US"/>
@@ -3080,6 +3100,7 @@
           <a:p>
             <a:fld id="{0EF7F39D-C77D-4041-9320-0257EEFDD78C}" type="slidenum">
               <a:rPr lang="en-US" smtClean="0"/>
+              <a:pPr/>
               <a:t>‹#›</a:t>
             </a:fld>
             <a:endParaRPr lang="en-US"/>
@@ -3095,7 +3116,7 @@
 </file>
 
 <file path=ppt/slideLayouts/slideLayout8.xml><?xml version="1.0" encoding="utf-8"?>
-<p:sldLayout xmlns:a="http://schemas.openxmlformats.org/drawingml/2006/main" xmlns:r="http://schemas.openxmlformats.org/officeDocument/2006/relationships" xmlns:p="http://schemas.openxmlformats.org/presentationml/2006/main" showMasterSp="0" type="objTx" preserve="1">
+<p:sldLayout xmlns:a="http://schemas.openxmlformats.org/drawingml/2006/main" xmlns:r="http://schemas.openxmlformats.org/officeDocument/2006/relationships" xmlns:mc="http://schemas.openxmlformats.org/markup-compatibility/2006" xmlns:mv="urn:schemas-microsoft-com:mac:vml" xmlns:p="http://schemas.openxmlformats.org/presentationml/2006/main" mc:Ignorable="mv" mc:PreserveAttributes="mv:*" showMasterSp="0" type="objTx" preserve="1">
   <p:cSld name="Content with Caption">
     <p:spTree>
       <p:nvGrpSpPr>
@@ -3468,6 +3489,7 @@
           <a:p>
             <a:fld id="{4F310800-ADAC-3D47-A1ED-30EBE55D9E2F}" type="datetimeFigureOut">
               <a:rPr lang="en-US" smtClean="0"/>
+              <a:pPr/>
               <a:t>5/3/16</a:t>
             </a:fld>
             <a:endParaRPr lang="en-US"/>
@@ -3532,6 +3554,7 @@
           <a:p>
             <a:fld id="{0EF7F39D-C77D-4041-9320-0257EEFDD78C}" type="slidenum">
               <a:rPr lang="en-US" smtClean="0"/>
+              <a:pPr/>
               <a:t>‹#›</a:t>
             </a:fld>
             <a:endParaRPr lang="en-US"/>
@@ -3547,7 +3570,7 @@
 </file>
 
 <file path=ppt/slideLayouts/slideLayout9.xml><?xml version="1.0" encoding="utf-8"?>
-<p:sldLayout xmlns:a="http://schemas.openxmlformats.org/drawingml/2006/main" xmlns:r="http://schemas.openxmlformats.org/officeDocument/2006/relationships" xmlns:p="http://schemas.openxmlformats.org/presentationml/2006/main" showMasterSp="0" type="picTx" preserve="1">
+<p:sldLayout xmlns:a="http://schemas.openxmlformats.org/drawingml/2006/main" xmlns:r="http://schemas.openxmlformats.org/officeDocument/2006/relationships" xmlns:mc="http://schemas.openxmlformats.org/markup-compatibility/2006" xmlns:mv="urn:schemas-microsoft-com:mac:vml" xmlns:p="http://schemas.openxmlformats.org/presentationml/2006/main" mc:Ignorable="mv" mc:PreserveAttributes="mv:*" showMasterSp="0" type="picTx" preserve="1">
   <p:cSld name="Picture with Caption">
     <p:spTree>
       <p:nvGrpSpPr>
@@ -4001,6 +4024,7 @@
           <a:p>
             <a:fld id="{4F310800-ADAC-3D47-A1ED-30EBE55D9E2F}" type="datetimeFigureOut">
               <a:rPr lang="en-US" smtClean="0"/>
+              <a:pPr/>
               <a:t>5/3/16</a:t>
             </a:fld>
             <a:endParaRPr lang="en-US"/>
@@ -4043,6 +4067,7 @@
           <a:p>
             <a:fld id="{0EF7F39D-C77D-4041-9320-0257EEFDD78C}" type="slidenum">
               <a:rPr lang="en-US" smtClean="0"/>
+              <a:pPr/>
               <a:t>‹#›</a:t>
             </a:fld>
             <a:endParaRPr lang="en-US"/>
@@ -4058,7 +4083,7 @@
 </file>
 
 <file path=ppt/slideMasters/slideMaster1.xml><?xml version="1.0" encoding="utf-8"?>
-<p:sldMaster xmlns:a="http://schemas.openxmlformats.org/drawingml/2006/main" xmlns:r="http://schemas.openxmlformats.org/officeDocument/2006/relationships" xmlns:p="http://schemas.openxmlformats.org/presentationml/2006/main">
+<p:sldMaster xmlns:a="http://schemas.openxmlformats.org/drawingml/2006/main" xmlns:r="http://schemas.openxmlformats.org/officeDocument/2006/relationships" xmlns:mc="http://schemas.openxmlformats.org/markup-compatibility/2006" xmlns:mv="urn:schemas-microsoft-com:mac:vml" xmlns:p="http://schemas.openxmlformats.org/presentationml/2006/main" mc:Ignorable="mv" mc:PreserveAttributes="mv:*">
   <p:cSld>
     <p:bg>
       <p:bgRef idx="1001">
@@ -4841,6 +4866,7 @@
           <a:p>
             <a:fld id="{4F310800-ADAC-3D47-A1ED-30EBE55D9E2F}" type="datetimeFigureOut">
               <a:rPr lang="en-US" smtClean="0"/>
+              <a:pPr/>
               <a:t>5/3/16</a:t>
             </a:fld>
             <a:endParaRPr lang="en-US"/>
@@ -4922,6 +4948,7 @@
           <a:p>
             <a:fld id="{0EF7F39D-C77D-4041-9320-0257EEFDD78C}" type="slidenum">
               <a:rPr lang="en-US" smtClean="0"/>
+              <a:pPr/>
               <a:t>‹#›</a:t>
             </a:fld>
             <a:endParaRPr lang="en-US"/>
@@ -5222,7 +5249,7 @@
 </file>
 
 <file path=ppt/slides/slide1.xml><?xml version="1.0" encoding="utf-8"?>
-<p:sld xmlns:a="http://schemas.openxmlformats.org/drawingml/2006/main" xmlns:r="http://schemas.openxmlformats.org/officeDocument/2006/relationships" xmlns:p="http://schemas.openxmlformats.org/presentationml/2006/main">
+<p:sld xmlns:a="http://schemas.openxmlformats.org/drawingml/2006/main" xmlns:r="http://schemas.openxmlformats.org/officeDocument/2006/relationships" xmlns:mc="http://schemas.openxmlformats.org/markup-compatibility/2006" xmlns:mv="urn:schemas-microsoft-com:mac:vml" xmlns:p="http://schemas.openxmlformats.org/presentationml/2006/main" mc:Ignorable="mv" mc:PreserveAttributes="mv:*">
   <p:cSld>
     <p:spTree>
       <p:nvGrpSpPr>
@@ -5312,7 +5339,7 @@
     </p:spTree>
     <p:extLst>
       <p:ext uri="{BB962C8B-B14F-4D97-AF65-F5344CB8AC3E}">
-        <p14:creationId xmlns:p14="http://schemas.microsoft.com/office/powerpoint/2010/main" val="2153570589"/>
+        <p14:creationId xmlns:p14="http://schemas.microsoft.com/office/powerpoint/2010/main" xmlns:p="http://schemas.openxmlformats.org/presentationml/2006/main" xmlns:r="http://schemas.openxmlformats.org/officeDocument/2006/relationships" xmlns:a="http://schemas.openxmlformats.org/drawingml/2006/main" xmlns="" val="2153570589"/>
       </p:ext>
     </p:extLst>
   </p:cSld>
@@ -5323,7 +5350,7 @@
 </file>
 
 <file path=ppt/slides/slide10.xml><?xml version="1.0" encoding="utf-8"?>
-<p:sld xmlns:a="http://schemas.openxmlformats.org/drawingml/2006/main" xmlns:r="http://schemas.openxmlformats.org/officeDocument/2006/relationships" xmlns:p="http://schemas.openxmlformats.org/presentationml/2006/main">
+<p:sld xmlns:a="http://schemas.openxmlformats.org/drawingml/2006/main" xmlns:r="http://schemas.openxmlformats.org/officeDocument/2006/relationships" xmlns:mc="http://schemas.openxmlformats.org/markup-compatibility/2006" xmlns:mv="urn:schemas-microsoft-com:mac:vml" xmlns:p="http://schemas.openxmlformats.org/presentationml/2006/main" mc:Ignorable="mv" mc:PreserveAttributes="mv:*">
   <p:cSld>
     <p:spTree>
       <p:nvGrpSpPr>
@@ -5464,7 +5491,7 @@
     </p:spTree>
     <p:extLst>
       <p:ext uri="{BB962C8B-B14F-4D97-AF65-F5344CB8AC3E}">
-        <p14:creationId xmlns:p14="http://schemas.microsoft.com/office/powerpoint/2010/main" val="1699293286"/>
+        <p14:creationId xmlns:p14="http://schemas.microsoft.com/office/powerpoint/2010/main" xmlns:p="http://schemas.openxmlformats.org/presentationml/2006/main" xmlns:r="http://schemas.openxmlformats.org/officeDocument/2006/relationships" xmlns:a="http://schemas.openxmlformats.org/drawingml/2006/main" xmlns="" val="1699293286"/>
       </p:ext>
     </p:extLst>
   </p:cSld>
@@ -5475,7 +5502,7 @@
 </file>
 
 <file path=ppt/slides/slide11.xml><?xml version="1.0" encoding="utf-8"?>
-<p:sld xmlns:a="http://schemas.openxmlformats.org/drawingml/2006/main" xmlns:r="http://schemas.openxmlformats.org/officeDocument/2006/relationships" xmlns:p="http://schemas.openxmlformats.org/presentationml/2006/main">
+<p:sld xmlns:a="http://schemas.openxmlformats.org/drawingml/2006/main" xmlns:r="http://schemas.openxmlformats.org/officeDocument/2006/relationships" xmlns:mc="http://schemas.openxmlformats.org/markup-compatibility/2006" xmlns:mv="urn:schemas-microsoft-com:mac:vml" xmlns:p="http://schemas.openxmlformats.org/presentationml/2006/main" mc:Ignorable="mv" mc:PreserveAttributes="mv:*">
   <p:cSld>
     <p:spTree>
       <p:nvGrpSpPr>
@@ -5528,7 +5555,7 @@
           <a:blip r:embed="rId2">
             <a:extLst>
               <a:ext uri="{28A0092B-C50C-407E-A947-70E740481C1C}">
-                <a14:useLocalDpi xmlns:a14="http://schemas.microsoft.com/office/drawing/2010/main" val="0"/>
+                <a14:useLocalDpi xmlns:a14="http://schemas.microsoft.com/office/drawing/2010/main" xmlns:p="http://schemas.openxmlformats.org/presentationml/2006/main" xmlns:r="http://schemas.openxmlformats.org/officeDocument/2006/relationships" xmlns:a="http://schemas.openxmlformats.org/drawingml/2006/main" xmlns="" val="0"/>
               </a:ext>
             </a:extLst>
           </a:blip>
@@ -5542,7 +5569,7 @@
     </p:spTree>
     <p:extLst>
       <p:ext uri="{BB962C8B-B14F-4D97-AF65-F5344CB8AC3E}">
-        <p14:creationId xmlns:p14="http://schemas.microsoft.com/office/powerpoint/2010/main" val="2842929931"/>
+        <p14:creationId xmlns:p14="http://schemas.microsoft.com/office/powerpoint/2010/main" xmlns:p="http://schemas.openxmlformats.org/presentationml/2006/main" xmlns:r="http://schemas.openxmlformats.org/officeDocument/2006/relationships" xmlns:a="http://schemas.openxmlformats.org/drawingml/2006/main" xmlns="" val="2842929931"/>
       </p:ext>
     </p:extLst>
   </p:cSld>
@@ -5553,7 +5580,7 @@
 </file>
 
 <file path=ppt/slides/slide12.xml><?xml version="1.0" encoding="utf-8"?>
-<p:sld xmlns:a="http://schemas.openxmlformats.org/drawingml/2006/main" xmlns:r="http://schemas.openxmlformats.org/officeDocument/2006/relationships" xmlns:p="http://schemas.openxmlformats.org/presentationml/2006/main">
+<p:sld xmlns:a="http://schemas.openxmlformats.org/drawingml/2006/main" xmlns:r="http://schemas.openxmlformats.org/officeDocument/2006/relationships" xmlns:mc="http://schemas.openxmlformats.org/markup-compatibility/2006" xmlns:mv="urn:schemas-microsoft-com:mac:vml" xmlns:p="http://schemas.openxmlformats.org/presentationml/2006/main" mc:Ignorable="mv" mc:PreserveAttributes="mv:*">
   <p:cSld>
     <p:spTree>
       <p:nvGrpSpPr>
@@ -5613,7 +5640,29 @@
             </a:pPr>
             <a:r>
               <a:rPr lang="en-US" dirty="0" smtClean="0"/>
-              <a:t>Selection also occurs when the user gathers collectibles to gain points via navigation of the flappy bird </a:t>
+              <a:t>Selection also occurs when the user gathers collectibles to gain points via navigation of the flappy bird</a:t>
+            </a:r>
+            <a:r>
+              <a:rPr lang="en-US" dirty="0" smtClean="0"/>
+              <a:t> </a:t>
+            </a:r>
+          </a:p>
+          <a:p>
+            <a:pPr marL="285750" indent="-285750">
+              <a:buFont typeface="Arial"/>
+              <a:buChar char="•"/>
+            </a:pPr>
+            <a:r>
+              <a:rPr lang="en-US" dirty="0" smtClean="0"/>
+              <a:t>We are debugging a wand that can select and destroy clouds, removing the obstacles from the path of the </a:t>
+            </a:r>
+            <a:r>
+              <a:rPr lang="en-US" dirty="0" err="1" smtClean="0"/>
+              <a:t>Flappy</a:t>
+            </a:r>
+            <a:r>
+              <a:rPr lang="en-US" dirty="0" smtClean="0"/>
+              <a:t> Bird. </a:t>
             </a:r>
             <a:endParaRPr lang="en-US" dirty="0"/>
           </a:p>
@@ -5622,7 +5671,7 @@
     </p:spTree>
     <p:extLst>
       <p:ext uri="{BB962C8B-B14F-4D97-AF65-F5344CB8AC3E}">
-        <p14:creationId xmlns:p14="http://schemas.microsoft.com/office/powerpoint/2010/main" val="1177448169"/>
+        <p14:creationId xmlns:p14="http://schemas.microsoft.com/office/powerpoint/2010/main" xmlns:p="http://schemas.openxmlformats.org/presentationml/2006/main" xmlns:r="http://schemas.openxmlformats.org/officeDocument/2006/relationships" xmlns:a="http://schemas.openxmlformats.org/drawingml/2006/main" xmlns="" val="1177448169"/>
       </p:ext>
     </p:extLst>
   </p:cSld>
@@ -5633,7 +5682,7 @@
 </file>
 
 <file path=ppt/slides/slide13.xml><?xml version="1.0" encoding="utf-8"?>
-<p:sld xmlns:a="http://schemas.openxmlformats.org/drawingml/2006/main" xmlns:r="http://schemas.openxmlformats.org/officeDocument/2006/relationships" xmlns:p="http://schemas.openxmlformats.org/presentationml/2006/main">
+<p:sld xmlns:a="http://schemas.openxmlformats.org/drawingml/2006/main" xmlns:r="http://schemas.openxmlformats.org/officeDocument/2006/relationships" xmlns:mc="http://schemas.openxmlformats.org/markup-compatibility/2006" xmlns:mv="urn:schemas-microsoft-com:mac:vml" xmlns:p="http://schemas.openxmlformats.org/presentationml/2006/main" mc:Ignorable="mv" mc:PreserveAttributes="mv:*">
   <p:cSld>
     <p:spTree>
       <p:nvGrpSpPr>
@@ -5686,7 +5735,7 @@
           <a:blip r:embed="rId2">
             <a:extLst>
               <a:ext uri="{28A0092B-C50C-407E-A947-70E740481C1C}">
-                <a14:useLocalDpi xmlns:a14="http://schemas.microsoft.com/office/drawing/2010/main" val="0"/>
+                <a14:useLocalDpi xmlns:a14="http://schemas.microsoft.com/office/drawing/2010/main" xmlns:p="http://schemas.openxmlformats.org/presentationml/2006/main" xmlns:r="http://schemas.openxmlformats.org/officeDocument/2006/relationships" xmlns:a="http://schemas.openxmlformats.org/drawingml/2006/main" xmlns="" val="0"/>
               </a:ext>
             </a:extLst>
           </a:blip>
@@ -5700,7 +5749,7 @@
     </p:spTree>
     <p:extLst>
       <p:ext uri="{BB962C8B-B14F-4D97-AF65-F5344CB8AC3E}">
-        <p14:creationId xmlns:p14="http://schemas.microsoft.com/office/powerpoint/2010/main" val="912238508"/>
+        <p14:creationId xmlns:p14="http://schemas.microsoft.com/office/powerpoint/2010/main" xmlns:p="http://schemas.openxmlformats.org/presentationml/2006/main" xmlns:r="http://schemas.openxmlformats.org/officeDocument/2006/relationships" xmlns:a="http://schemas.openxmlformats.org/drawingml/2006/main" xmlns="" val="912238508"/>
       </p:ext>
     </p:extLst>
   </p:cSld>
@@ -5711,7 +5760,7 @@
 </file>
 
 <file path=ppt/slides/slide14.xml><?xml version="1.0" encoding="utf-8"?>
-<p:sld xmlns:a="http://schemas.openxmlformats.org/drawingml/2006/main" xmlns:r="http://schemas.openxmlformats.org/officeDocument/2006/relationships" xmlns:p="http://schemas.openxmlformats.org/presentationml/2006/main">
+<p:sld xmlns:a="http://schemas.openxmlformats.org/drawingml/2006/main" xmlns:r="http://schemas.openxmlformats.org/officeDocument/2006/relationships" xmlns:mc="http://schemas.openxmlformats.org/markup-compatibility/2006" xmlns:mv="urn:schemas-microsoft-com:mac:vml" xmlns:p="http://schemas.openxmlformats.org/presentationml/2006/main" mc:Ignorable="mv" mc:PreserveAttributes="mv:*">
   <p:cSld>
     <p:spTree>
       <p:nvGrpSpPr>
@@ -5771,8 +5820,27 @@
             </a:pPr>
             <a:r>
               <a:rPr lang="en-US" dirty="0" smtClean="0"/>
-              <a:t>Keeps the user aware of his/her score </a:t>
-            </a:r>
+              <a:t>Keeps the user aware of his/her score</a:t>
+            </a:r>
+            <a:r>
+              <a:rPr lang="en-US" dirty="0" smtClean="0"/>
+              <a:t> </a:t>
+            </a:r>
+          </a:p>
+          <a:p>
+            <a:pPr lvl="2">
+              <a:buFont typeface="Arial"/>
+              <a:buChar char="•"/>
+            </a:pPr>
+            <a:r>
+              <a:rPr lang="en-US" dirty="0" smtClean="0"/>
+              <a:t>Score based on collectibles and </a:t>
+            </a:r>
+            <a:r>
+              <a:rPr lang="en-US" dirty="0" smtClean="0"/>
+              <a:t>distance travelled</a:t>
+            </a:r>
+            <a:endParaRPr lang="en-US" dirty="0" smtClean="0"/>
           </a:p>
           <a:p>
             <a:pPr>
@@ -5799,7 +5867,7 @@
     </p:spTree>
     <p:extLst>
       <p:ext uri="{BB962C8B-B14F-4D97-AF65-F5344CB8AC3E}">
-        <p14:creationId xmlns:p14="http://schemas.microsoft.com/office/powerpoint/2010/main" val="3494999010"/>
+        <p14:creationId xmlns:p14="http://schemas.microsoft.com/office/powerpoint/2010/main" xmlns:p="http://schemas.openxmlformats.org/presentationml/2006/main" xmlns:r="http://schemas.openxmlformats.org/officeDocument/2006/relationships" xmlns:a="http://schemas.openxmlformats.org/drawingml/2006/main" xmlns="" val="3494999010"/>
       </p:ext>
     </p:extLst>
   </p:cSld>
@@ -5810,7 +5878,7 @@
 </file>
 
 <file path=ppt/slides/slide15.xml><?xml version="1.0" encoding="utf-8"?>
-<p:sld xmlns:a="http://schemas.openxmlformats.org/drawingml/2006/main" xmlns:r="http://schemas.openxmlformats.org/officeDocument/2006/relationships" xmlns:p="http://schemas.openxmlformats.org/presentationml/2006/main">
+<p:sld xmlns:a="http://schemas.openxmlformats.org/drawingml/2006/main" xmlns:r="http://schemas.openxmlformats.org/officeDocument/2006/relationships" xmlns:mc="http://schemas.openxmlformats.org/markup-compatibility/2006" xmlns:mv="urn:schemas-microsoft-com:mac:vml" xmlns:p="http://schemas.openxmlformats.org/presentationml/2006/main" mc:Ignorable="mv" mc:PreserveAttributes="mv:*">
   <p:cSld>
     <p:spTree>
       <p:nvGrpSpPr>
@@ -5843,41 +5911,63 @@
           <a:p>
             <a:r>
               <a:rPr lang="en-US" dirty="0" smtClean="0"/>
-              <a:t>Score tracker</a:t>
+              <a:t>Score</a:t>
+            </a:r>
+            <a:r>
+              <a:rPr lang="en-US" dirty="0" smtClean="0"/>
+              <a:t> and health tracker</a:t>
             </a:r>
             <a:endParaRPr lang="en-US" dirty="0"/>
+          </a:p>
+        </p:txBody>
+      </p:sp>
+      <p:sp>
+        <p:nvSpPr>
+          <p:cNvPr id="5" name="Content Placeholder 4"/>
+          <p:cNvSpPr>
+            <a:spLocks noGrp="1"/>
+          </p:cNvSpPr>
+          <p:nvPr>
+            <p:ph idx="1"/>
+          </p:nvPr>
+        </p:nvSpPr>
+        <p:spPr/>
+        <p:txBody>
+          <a:bodyPr/>
+          <a:lstStyle/>
+          <a:p>
+            <a:endParaRPr lang="es-AR"/>
           </a:p>
         </p:txBody>
       </p:sp>
       <p:pic>
         <p:nvPicPr>
-          <p:cNvPr id="4" name="Content Placeholder 3" descr="Screen Shot 2016-05-03 at 3.30.53 AM.png"/>
+          <p:cNvPr id="6" name="Picture 5"/>
           <p:cNvPicPr>
-            <a:picLocks noGrp="1" noChangeAspect="1"/>
+            <a:picLocks noChangeAspect="1"/>
           </p:cNvPicPr>
-          <p:nvPr>
-            <p:ph idx="1"/>
-          </p:nvPr>
+          <p:nvPr/>
         </p:nvPicPr>
         <p:blipFill>
-          <a:blip r:embed="rId2">
-            <a:extLst>
-              <a:ext uri="{28A0092B-C50C-407E-A947-70E740481C1C}">
-                <a14:useLocalDpi xmlns:a14="http://schemas.microsoft.com/office/drawing/2010/main" val="0"/>
-              </a:ext>
-            </a:extLst>
-          </a:blip>
-          <a:srcRect t="8658" b="8658"/>
+          <a:blip r:embed="rId2"/>
           <a:stretch>
             <a:fillRect/>
           </a:stretch>
         </p:blipFill>
-        <p:spPr/>
+        <p:spPr>
+          <a:xfrm>
+            <a:off x="817290" y="1100628"/>
+            <a:ext cx="7526609" cy="3588968"/>
+          </a:xfrm>
+          <a:prstGeom prst="rect">
+            <a:avLst/>
+          </a:prstGeom>
+        </p:spPr>
       </p:pic>
     </p:spTree>
     <p:extLst>
       <p:ext uri="{BB962C8B-B14F-4D97-AF65-F5344CB8AC3E}">
-        <p14:creationId xmlns:p14="http://schemas.microsoft.com/office/powerpoint/2010/main" val="1476311723"/>
+        <p14:creationId xmlns:p14="http://schemas.microsoft.com/office/powerpoint/2010/main" xmlns:p="http://schemas.openxmlformats.org/presentationml/2006/main" xmlns:r="http://schemas.openxmlformats.org/officeDocument/2006/relationships" xmlns:a="http://schemas.openxmlformats.org/drawingml/2006/main" xmlns="" val="1476311723"/>
       </p:ext>
     </p:extLst>
   </p:cSld>
@@ -5888,7 +5978,7 @@
 </file>
 
 <file path=ppt/slides/slide16.xml><?xml version="1.0" encoding="utf-8"?>
-<p:sld xmlns:a="http://schemas.openxmlformats.org/drawingml/2006/main" xmlns:r="http://schemas.openxmlformats.org/officeDocument/2006/relationships" xmlns:p="http://schemas.openxmlformats.org/presentationml/2006/main">
+<p:sld xmlns:a="http://schemas.openxmlformats.org/drawingml/2006/main" xmlns:r="http://schemas.openxmlformats.org/officeDocument/2006/relationships" xmlns:mc="http://schemas.openxmlformats.org/markup-compatibility/2006" xmlns:mv="urn:schemas-microsoft-com:mac:vml" xmlns:p="http://schemas.openxmlformats.org/presentationml/2006/main" mc:Ignorable="mv" mc:PreserveAttributes="mv:*">
   <p:cSld>
     <p:spTree>
       <p:nvGrpSpPr>
@@ -5968,7 +6058,15 @@
             </a:pPr>
             <a:r>
               <a:rPr lang="en-US" dirty="0" smtClean="0"/>
-              <a:t>Changes the score multiplier – the smaller the flappy bird, the smaller the value of a coin will be and vice-versa </a:t>
+              <a:t>Changes the score multiplier – the smaller the flappy bird, the</a:t>
+            </a:r>
+            <a:r>
+              <a:rPr lang="en-US" dirty="0" smtClean="0"/>
+              <a:t> </a:t>
+            </a:r>
+            <a:r>
+              <a:rPr lang="en-US" dirty="0" smtClean="0"/>
+              <a:t>slower the user’s score increases as they traverse through the obstacles. </a:t>
             </a:r>
             <a:endParaRPr lang="en-US" dirty="0"/>
           </a:p>
@@ -5977,7 +6075,7 @@
     </p:spTree>
     <p:extLst>
       <p:ext uri="{BB962C8B-B14F-4D97-AF65-F5344CB8AC3E}">
-        <p14:creationId xmlns:p14="http://schemas.microsoft.com/office/powerpoint/2010/main" val="1495457053"/>
+        <p14:creationId xmlns:p14="http://schemas.microsoft.com/office/powerpoint/2010/main" xmlns:p="http://schemas.openxmlformats.org/presentationml/2006/main" xmlns:r="http://schemas.openxmlformats.org/officeDocument/2006/relationships" xmlns:a="http://schemas.openxmlformats.org/drawingml/2006/main" xmlns="" val="1495457053"/>
       </p:ext>
     </p:extLst>
   </p:cSld>
@@ -5988,7 +6086,7 @@
 </file>
 
 <file path=ppt/slides/slide17.xml><?xml version="1.0" encoding="utf-8"?>
-<p:sld xmlns:a="http://schemas.openxmlformats.org/drawingml/2006/main" xmlns:r="http://schemas.openxmlformats.org/officeDocument/2006/relationships" xmlns:p="http://schemas.openxmlformats.org/presentationml/2006/main">
+<p:sld xmlns:a="http://schemas.openxmlformats.org/drawingml/2006/main" xmlns:r="http://schemas.openxmlformats.org/officeDocument/2006/relationships" xmlns:mc="http://schemas.openxmlformats.org/markup-compatibility/2006" xmlns:mv="urn:schemas-microsoft-com:mac:vml" xmlns:p="http://schemas.openxmlformats.org/presentationml/2006/main" mc:Ignorable="mv" mc:PreserveAttributes="mv:*">
   <p:cSld>
     <p:spTree>
       <p:nvGrpSpPr>
@@ -6041,7 +6139,7 @@
           <a:blip r:embed="rId2">
             <a:extLst>
               <a:ext uri="{28A0092B-C50C-407E-A947-70E740481C1C}">
-                <a14:useLocalDpi xmlns:a14="http://schemas.microsoft.com/office/drawing/2010/main" val="0"/>
+                <a14:useLocalDpi xmlns:a14="http://schemas.microsoft.com/office/drawing/2010/main" xmlns:p="http://schemas.openxmlformats.org/presentationml/2006/main" xmlns:r="http://schemas.openxmlformats.org/officeDocument/2006/relationships" xmlns:a="http://schemas.openxmlformats.org/drawingml/2006/main" xmlns="" val="0"/>
               </a:ext>
             </a:extLst>
           </a:blip>
@@ -6052,15 +6150,15 @@
         </p:blipFill>
         <p:spPr>
           <a:xfrm rot="5400000">
-            <a:off x="1873392" y="2719253"/>
-            <a:ext cx="5440512" cy="2589598"/>
+            <a:off x="2550329" y="1662920"/>
+            <a:ext cx="4086638" cy="2589598"/>
           </a:xfrm>
         </p:spPr>
       </p:pic>
     </p:spTree>
     <p:extLst>
       <p:ext uri="{BB962C8B-B14F-4D97-AF65-F5344CB8AC3E}">
-        <p14:creationId xmlns:p14="http://schemas.microsoft.com/office/powerpoint/2010/main" val="2303962132"/>
+        <p14:creationId xmlns:p14="http://schemas.microsoft.com/office/powerpoint/2010/main" xmlns:p="http://schemas.openxmlformats.org/presentationml/2006/main" xmlns:r="http://schemas.openxmlformats.org/officeDocument/2006/relationships" xmlns:a="http://schemas.openxmlformats.org/drawingml/2006/main" xmlns="" val="2303962132"/>
       </p:ext>
     </p:extLst>
   </p:cSld>
@@ -6071,7 +6169,7 @@
 </file>
 
 <file path=ppt/slides/slide18.xml><?xml version="1.0" encoding="utf-8"?>
-<p:sld xmlns:a="http://schemas.openxmlformats.org/drawingml/2006/main" xmlns:r="http://schemas.openxmlformats.org/officeDocument/2006/relationships" xmlns:p="http://schemas.openxmlformats.org/presentationml/2006/main">
+<p:sld xmlns:a="http://schemas.openxmlformats.org/drawingml/2006/main" xmlns:r="http://schemas.openxmlformats.org/officeDocument/2006/relationships" xmlns:mc="http://schemas.openxmlformats.org/markup-compatibility/2006" xmlns:mv="urn:schemas-microsoft-com:mac:vml" xmlns:p="http://schemas.openxmlformats.org/presentationml/2006/main" mc:Ignorable="mv" mc:PreserveAttributes="mv:*">
   <p:cSld>
     <p:spTree>
       <p:nvGrpSpPr>
@@ -6118,7 +6216,7 @@
     </p:spTree>
     <p:extLst>
       <p:ext uri="{BB962C8B-B14F-4D97-AF65-F5344CB8AC3E}">
-        <p14:creationId xmlns:p14="http://schemas.microsoft.com/office/powerpoint/2010/main" val="1167078882"/>
+        <p14:creationId xmlns:p14="http://schemas.microsoft.com/office/powerpoint/2010/main" xmlns:p="http://schemas.openxmlformats.org/presentationml/2006/main" xmlns:r="http://schemas.openxmlformats.org/officeDocument/2006/relationships" xmlns:a="http://schemas.openxmlformats.org/drawingml/2006/main" xmlns="" val="1167078882"/>
       </p:ext>
     </p:extLst>
   </p:cSld>
@@ -6129,7 +6227,7 @@
 </file>
 
 <file path=ppt/slides/slide2.xml><?xml version="1.0" encoding="utf-8"?>
-<p:sld xmlns:a="http://schemas.openxmlformats.org/drawingml/2006/main" xmlns:r="http://schemas.openxmlformats.org/officeDocument/2006/relationships" xmlns:p="http://schemas.openxmlformats.org/presentationml/2006/main">
+<p:sld xmlns:a="http://schemas.openxmlformats.org/drawingml/2006/main" xmlns:r="http://schemas.openxmlformats.org/officeDocument/2006/relationships" xmlns:mc="http://schemas.openxmlformats.org/markup-compatibility/2006" xmlns:mv="urn:schemas-microsoft-com:mac:vml" xmlns:p="http://schemas.openxmlformats.org/presentationml/2006/main" mc:Ignorable="mv" mc:PreserveAttributes="mv:*">
   <p:cSld>
     <p:spTree>
       <p:nvGrpSpPr>
@@ -6236,7 +6334,7 @@
     </p:spTree>
     <p:extLst>
       <p:ext uri="{BB962C8B-B14F-4D97-AF65-F5344CB8AC3E}">
-        <p14:creationId xmlns:p14="http://schemas.microsoft.com/office/powerpoint/2010/main" val="553015436"/>
+        <p14:creationId xmlns:p14="http://schemas.microsoft.com/office/powerpoint/2010/main" xmlns:p="http://schemas.openxmlformats.org/presentationml/2006/main" xmlns:r="http://schemas.openxmlformats.org/officeDocument/2006/relationships" xmlns:a="http://schemas.openxmlformats.org/drawingml/2006/main" xmlns="" val="553015436"/>
       </p:ext>
     </p:extLst>
   </p:cSld>
@@ -6247,7 +6345,7 @@
 </file>
 
 <file path=ppt/slides/slide3.xml><?xml version="1.0" encoding="utf-8"?>
-<p:sld xmlns:a="http://schemas.openxmlformats.org/drawingml/2006/main" xmlns:r="http://schemas.openxmlformats.org/officeDocument/2006/relationships" xmlns:p="http://schemas.openxmlformats.org/presentationml/2006/main">
+<p:sld xmlns:a="http://schemas.openxmlformats.org/drawingml/2006/main" xmlns:r="http://schemas.openxmlformats.org/officeDocument/2006/relationships" xmlns:mc="http://schemas.openxmlformats.org/markup-compatibility/2006" xmlns:mv="urn:schemas-microsoft-com:mac:vml" xmlns:p="http://schemas.openxmlformats.org/presentationml/2006/main" mc:Ignorable="mv" mc:PreserveAttributes="mv:*">
   <p:cSld>
     <p:spTree>
       <p:nvGrpSpPr>
@@ -6387,7 +6485,7 @@
     </p:spTree>
     <p:extLst>
       <p:ext uri="{BB962C8B-B14F-4D97-AF65-F5344CB8AC3E}">
-        <p14:creationId xmlns:p14="http://schemas.microsoft.com/office/powerpoint/2010/main" val="3374318323"/>
+        <p14:creationId xmlns:p14="http://schemas.microsoft.com/office/powerpoint/2010/main" xmlns:p="http://schemas.openxmlformats.org/presentationml/2006/main" xmlns:r="http://schemas.openxmlformats.org/officeDocument/2006/relationships" xmlns:a="http://schemas.openxmlformats.org/drawingml/2006/main" xmlns="" val="3374318323"/>
       </p:ext>
     </p:extLst>
   </p:cSld>
@@ -6398,7 +6496,7 @@
 </file>
 
 <file path=ppt/slides/slide4.xml><?xml version="1.0" encoding="utf-8"?>
-<p:sld xmlns:a="http://schemas.openxmlformats.org/drawingml/2006/main" xmlns:r="http://schemas.openxmlformats.org/officeDocument/2006/relationships" xmlns:p="http://schemas.openxmlformats.org/presentationml/2006/main">
+<p:sld xmlns:a="http://schemas.openxmlformats.org/drawingml/2006/main" xmlns:r="http://schemas.openxmlformats.org/officeDocument/2006/relationships" xmlns:mc="http://schemas.openxmlformats.org/markup-compatibility/2006" xmlns:mv="urn:schemas-microsoft-com:mac:vml" xmlns:p="http://schemas.openxmlformats.org/presentationml/2006/main" mc:Ignorable="mv" mc:PreserveAttributes="mv:*">
   <p:cSld>
     <p:spTree>
       <p:nvGrpSpPr>
@@ -6513,7 +6611,7 @@
     </p:spTree>
     <p:extLst>
       <p:ext uri="{BB962C8B-B14F-4D97-AF65-F5344CB8AC3E}">
-        <p14:creationId xmlns:p14="http://schemas.microsoft.com/office/powerpoint/2010/main" val="4002011604"/>
+        <p14:creationId xmlns:p14="http://schemas.microsoft.com/office/powerpoint/2010/main" xmlns:p="http://schemas.openxmlformats.org/presentationml/2006/main" xmlns:r="http://schemas.openxmlformats.org/officeDocument/2006/relationships" xmlns:a="http://schemas.openxmlformats.org/drawingml/2006/main" xmlns="" val="4002011604"/>
       </p:ext>
     </p:extLst>
   </p:cSld>
@@ -6524,7 +6622,7 @@
 </file>
 
 <file path=ppt/slides/slide5.xml><?xml version="1.0" encoding="utf-8"?>
-<p:sld xmlns:a="http://schemas.openxmlformats.org/drawingml/2006/main" xmlns:r="http://schemas.openxmlformats.org/officeDocument/2006/relationships" xmlns:p="http://schemas.openxmlformats.org/presentationml/2006/main">
+<p:sld xmlns:a="http://schemas.openxmlformats.org/drawingml/2006/main" xmlns:r="http://schemas.openxmlformats.org/officeDocument/2006/relationships" xmlns:mc="http://schemas.openxmlformats.org/markup-compatibility/2006" xmlns:mv="urn:schemas-microsoft-com:mac:vml" xmlns:p="http://schemas.openxmlformats.org/presentationml/2006/main" mc:Ignorable="mv" mc:PreserveAttributes="mv:*">
   <p:cSld>
     <p:spTree>
       <p:nvGrpSpPr>
@@ -6577,7 +6675,7 @@
           <a:blip r:embed="rId3">
             <a:extLst>
               <a:ext uri="{28A0092B-C50C-407E-A947-70E740481C1C}">
-                <a14:useLocalDpi xmlns:a14="http://schemas.microsoft.com/office/drawing/2010/main" val="0"/>
+                <a14:useLocalDpi xmlns:a14="http://schemas.microsoft.com/office/drawing/2010/main" xmlns:p="http://schemas.openxmlformats.org/presentationml/2006/main" xmlns:r="http://schemas.openxmlformats.org/officeDocument/2006/relationships" xmlns:a="http://schemas.openxmlformats.org/drawingml/2006/main" xmlns="" val="0"/>
               </a:ext>
             </a:extLst>
           </a:blip>
@@ -6591,7 +6689,7 @@
     </p:spTree>
     <p:extLst>
       <p:ext uri="{BB962C8B-B14F-4D97-AF65-F5344CB8AC3E}">
-        <p14:creationId xmlns:p14="http://schemas.microsoft.com/office/powerpoint/2010/main" val="2482695083"/>
+        <p14:creationId xmlns:p14="http://schemas.microsoft.com/office/powerpoint/2010/main" xmlns:p="http://schemas.openxmlformats.org/presentationml/2006/main" xmlns:r="http://schemas.openxmlformats.org/officeDocument/2006/relationships" xmlns:a="http://schemas.openxmlformats.org/drawingml/2006/main" xmlns="" val="2482695083"/>
       </p:ext>
     </p:extLst>
   </p:cSld>
@@ -6601,7 +6699,7 @@
   <p:timing>
     <p:tnLst>
       <p:par>
-        <p:cTn xmlns:p14="http://schemas.microsoft.com/office/powerpoint/2010/main" id="1" dur="indefinite" restart="never" nodeType="tmRoot"/>
+        <p:cTn id="1" dur="indefinite" restart="never" nodeType="tmRoot"/>
       </p:par>
     </p:tnLst>
   </p:timing>
@@ -6609,7 +6707,7 @@
 </file>
 
 <file path=ppt/slides/slide6.xml><?xml version="1.0" encoding="utf-8"?>
-<p:sld xmlns:a="http://schemas.openxmlformats.org/drawingml/2006/main" xmlns:r="http://schemas.openxmlformats.org/officeDocument/2006/relationships" xmlns:p="http://schemas.openxmlformats.org/presentationml/2006/main">
+<p:sld xmlns:a="http://schemas.openxmlformats.org/drawingml/2006/main" xmlns:r="http://schemas.openxmlformats.org/officeDocument/2006/relationships" xmlns:mc="http://schemas.openxmlformats.org/markup-compatibility/2006" xmlns:mv="urn:schemas-microsoft-com:mac:vml" xmlns:p="http://schemas.openxmlformats.org/presentationml/2006/main" mc:Ignorable="mv" mc:PreserveAttributes="mv:*">
   <p:cSld>
     <p:spTree>
       <p:nvGrpSpPr>
@@ -6679,8 +6777,23 @@
             </a:pPr>
             <a:r>
               <a:rPr lang="en-US" dirty="0" smtClean="0"/>
-              <a:t>Makes the game more fun </a:t>
-            </a:r>
+              <a:t>Makes the game more fun</a:t>
+            </a:r>
+            <a:r>
+              <a:rPr lang="en-US" dirty="0" smtClean="0"/>
+              <a:t> </a:t>
+            </a:r>
+          </a:p>
+          <a:p>
+            <a:pPr marL="285750" indent="-285750">
+              <a:buFont typeface="Arial"/>
+              <a:buChar char="•"/>
+            </a:pPr>
+            <a:r>
+              <a:rPr lang="en-US" dirty="0" smtClean="0"/>
+              <a:t>Looks cool</a:t>
+            </a:r>
+            <a:endParaRPr lang="en-US" dirty="0" smtClean="0"/>
           </a:p>
           <a:p>
             <a:pPr marL="285750" indent="-285750">
@@ -6701,7 +6814,7 @@
     </p:spTree>
     <p:extLst>
       <p:ext uri="{BB962C8B-B14F-4D97-AF65-F5344CB8AC3E}">
-        <p14:creationId xmlns:p14="http://schemas.microsoft.com/office/powerpoint/2010/main" val="441423206"/>
+        <p14:creationId xmlns:p14="http://schemas.microsoft.com/office/powerpoint/2010/main" xmlns:p="http://schemas.openxmlformats.org/presentationml/2006/main" xmlns:r="http://schemas.openxmlformats.org/officeDocument/2006/relationships" xmlns:a="http://schemas.openxmlformats.org/drawingml/2006/main" xmlns="" val="441423206"/>
       </p:ext>
     </p:extLst>
   </p:cSld>
@@ -6712,7 +6825,7 @@
 </file>
 
 <file path=ppt/slides/slide7.xml><?xml version="1.0" encoding="utf-8"?>
-<p:sld xmlns:a="http://schemas.openxmlformats.org/drawingml/2006/main" xmlns:r="http://schemas.openxmlformats.org/officeDocument/2006/relationships" xmlns:p="http://schemas.openxmlformats.org/presentationml/2006/main">
+<p:sld xmlns:a="http://schemas.openxmlformats.org/drawingml/2006/main" xmlns:r="http://schemas.openxmlformats.org/officeDocument/2006/relationships" xmlns:mc="http://schemas.openxmlformats.org/markup-compatibility/2006" xmlns:mv="urn:schemas-microsoft-com:mac:vml" xmlns:p="http://schemas.openxmlformats.org/presentationml/2006/main" mc:Ignorable="mv" mc:PreserveAttributes="mv:*">
   <p:cSld>
     <p:spTree>
       <p:nvGrpSpPr>
@@ -6769,7 +6882,7 @@
           <a:blip r:embed="rId2">
             <a:extLst>
               <a:ext uri="{28A0092B-C50C-407E-A947-70E740481C1C}">
-                <a14:useLocalDpi xmlns:a14="http://schemas.microsoft.com/office/drawing/2010/main" val="0"/>
+                <a14:useLocalDpi xmlns:a14="http://schemas.microsoft.com/office/drawing/2010/main" xmlns:p="http://schemas.openxmlformats.org/presentationml/2006/main" xmlns:r="http://schemas.openxmlformats.org/officeDocument/2006/relationships" xmlns:a="http://schemas.openxmlformats.org/drawingml/2006/main" xmlns="" val="0"/>
               </a:ext>
             </a:extLst>
           </a:blip>
@@ -6778,12 +6891,17 @@
             <a:fillRect/>
           </a:stretch>
         </p:blipFill>
-        <p:spPr/>
+        <p:spPr>
+          <a:xfrm>
+            <a:off x="675544" y="532991"/>
+            <a:ext cx="7520940" cy="3945609"/>
+          </a:xfrm>
+        </p:spPr>
       </p:pic>
     </p:spTree>
     <p:extLst>
       <p:ext uri="{BB962C8B-B14F-4D97-AF65-F5344CB8AC3E}">
-        <p14:creationId xmlns:p14="http://schemas.microsoft.com/office/powerpoint/2010/main" val="2198034482"/>
+        <p14:creationId xmlns:p14="http://schemas.microsoft.com/office/powerpoint/2010/main" xmlns:p="http://schemas.openxmlformats.org/presentationml/2006/main" xmlns:r="http://schemas.openxmlformats.org/officeDocument/2006/relationships" xmlns:a="http://schemas.openxmlformats.org/drawingml/2006/main" xmlns="" val="2198034482"/>
       </p:ext>
     </p:extLst>
   </p:cSld>
@@ -6794,7 +6912,7 @@
 </file>
 
 <file path=ppt/slides/slide8.xml><?xml version="1.0" encoding="utf-8"?>
-<p:sld xmlns:a="http://schemas.openxmlformats.org/drawingml/2006/main" xmlns:r="http://schemas.openxmlformats.org/officeDocument/2006/relationships" xmlns:p="http://schemas.openxmlformats.org/presentationml/2006/main">
+<p:sld xmlns:a="http://schemas.openxmlformats.org/drawingml/2006/main" xmlns:r="http://schemas.openxmlformats.org/officeDocument/2006/relationships" xmlns:mc="http://schemas.openxmlformats.org/markup-compatibility/2006" xmlns:mv="urn:schemas-microsoft-com:mac:vml" xmlns:p="http://schemas.openxmlformats.org/presentationml/2006/main" mc:Ignorable="mv" mc:PreserveAttributes="mv:*">
   <p:cSld>
     <p:spTree>
       <p:nvGrpSpPr>
@@ -6915,7 +7033,7 @@
     </p:spTree>
     <p:extLst>
       <p:ext uri="{BB962C8B-B14F-4D97-AF65-F5344CB8AC3E}">
-        <p14:creationId xmlns:p14="http://schemas.microsoft.com/office/powerpoint/2010/main" val="2135780085"/>
+        <p14:creationId xmlns:p14="http://schemas.microsoft.com/office/powerpoint/2010/main" xmlns:p="http://schemas.openxmlformats.org/presentationml/2006/main" xmlns:r="http://schemas.openxmlformats.org/officeDocument/2006/relationships" xmlns:a="http://schemas.openxmlformats.org/drawingml/2006/main" xmlns="" val="2135780085"/>
       </p:ext>
     </p:extLst>
   </p:cSld>
@@ -6926,7 +7044,7 @@
 </file>
 
 <file path=ppt/slides/slide9.xml><?xml version="1.0" encoding="utf-8"?>
-<p:sld xmlns:a="http://schemas.openxmlformats.org/drawingml/2006/main" xmlns:r="http://schemas.openxmlformats.org/officeDocument/2006/relationships" xmlns:p="http://schemas.openxmlformats.org/presentationml/2006/main">
+<p:sld xmlns:a="http://schemas.openxmlformats.org/drawingml/2006/main" xmlns:r="http://schemas.openxmlformats.org/officeDocument/2006/relationships" xmlns:mc="http://schemas.openxmlformats.org/markup-compatibility/2006" xmlns:mv="urn:schemas-microsoft-com:mac:vml" xmlns:p="http://schemas.openxmlformats.org/presentationml/2006/main" mc:Ignorable="mv" mc:PreserveAttributes="mv:*">
   <p:cSld>
     <p:spTree>
       <p:nvGrpSpPr>
@@ -6979,7 +7097,7 @@
           <a:blip r:embed="rId2">
             <a:extLst>
               <a:ext uri="{28A0092B-C50C-407E-A947-70E740481C1C}">
-                <a14:useLocalDpi xmlns:a14="http://schemas.microsoft.com/office/drawing/2010/main" val="0"/>
+                <a14:useLocalDpi xmlns:a14="http://schemas.microsoft.com/office/drawing/2010/main" xmlns:p="http://schemas.openxmlformats.org/presentationml/2006/main" xmlns:r="http://schemas.openxmlformats.org/officeDocument/2006/relationships" xmlns:a="http://schemas.openxmlformats.org/drawingml/2006/main" xmlns="" val="0"/>
               </a:ext>
             </a:extLst>
           </a:blip>
@@ -6993,7 +7111,7 @@
     </p:spTree>
     <p:extLst>
       <p:ext uri="{BB962C8B-B14F-4D97-AF65-F5344CB8AC3E}">
-        <p14:creationId xmlns:p14="http://schemas.microsoft.com/office/powerpoint/2010/main" val="2915372999"/>
+        <p14:creationId xmlns:p14="http://schemas.microsoft.com/office/powerpoint/2010/main" xmlns:p="http://schemas.openxmlformats.org/presentationml/2006/main" xmlns:r="http://schemas.openxmlformats.org/officeDocument/2006/relationships" xmlns:a="http://schemas.openxmlformats.org/drawingml/2006/main" xmlns="" val="2915372999"/>
       </p:ext>
     </p:extLst>
   </p:cSld>

</xml_diff>